<commit_message>
create folder for survey cleaning workshop
</commit_message>
<xml_diff>
--- a/files/Block6-1_Sharing-Deposit.pptx
+++ b/files/Block6-1_Sharing-Deposit.pptx
@@ -15083,13 +15083,30 @@
             </a:r>
           </a:p>
           <a:p>
-            <a:pPr marL="742950" lvl="1" indent="-285750" algn="l">
+            <a:pPr marL="0" lvl="0" indent="0" algn="l" rtl="0">
+              <a:spcBef>
+                <a:spcPts val="0"/>
+              </a:spcBef>
+              <a:spcAft>
+                <a:spcPts val="0"/>
+              </a:spcAft>
+            </a:pPr>
+            <a:endParaRPr lang="en-US" sz="1600" dirty="0"/>
+          </a:p>
+          <a:p>
+            <a:pPr marL="285750" lvl="0" indent="-285750" algn="l" rtl="0">
+              <a:spcBef>
+                <a:spcPts val="0"/>
+              </a:spcBef>
+              <a:spcAft>
+                <a:spcPts val="0"/>
+              </a:spcAft>
               <a:buFont typeface="Arial" panose="020B0604020202020204" pitchFamily="34" charset="0"/>
               <a:buChar char="•"/>
             </a:pPr>
             <a:r>
               <a:rPr lang="en-US" sz="1600" dirty="0"/>
-              <a:t>294 datasets</a:t>
+              <a:t>Current numbers: </a:t>
             </a:r>
           </a:p>
           <a:p>
@@ -15099,7 +15116,27 @@
             </a:pPr>
             <a:r>
               <a:rPr lang="en-US" sz="1600" dirty="0"/>
-              <a:t>28 </a:t>
+              <a:t>250 datasets</a:t>
+            </a:r>
+          </a:p>
+          <a:p>
+            <a:pPr marL="1200150" lvl="2" indent="-285750" algn="l">
+              <a:buFont typeface="Arial" panose="020B0604020202020204" pitchFamily="34" charset="0"/>
+              <a:buChar char="•"/>
+            </a:pPr>
+            <a:r>
+              <a:rPr lang="en-US" sz="1600" dirty="0"/>
+              <a:t>+ 45 unpublished</a:t>
+            </a:r>
+          </a:p>
+          <a:p>
+            <a:pPr marL="742950" lvl="1" indent="-285750" algn="l">
+              <a:buFont typeface="Arial" panose="020B0604020202020204" pitchFamily="34" charset="0"/>
+              <a:buChar char="•"/>
+            </a:pPr>
+            <a:r>
+              <a:rPr lang="en-US" sz="1600" dirty="0"/>
+              <a:t>27 </a:t>
             </a:r>
             <a:r>
               <a:rPr lang="en-US" sz="1600" dirty="0" err="1"/>
@@ -15108,14 +15145,41 @@
             <a:endParaRPr lang="en-US" sz="1600" dirty="0"/>
           </a:p>
           <a:p>
-            <a:pPr marL="742950" lvl="1" indent="-285750" algn="l">
+            <a:pPr marL="1200150" lvl="2" indent="-285750" algn="l">
               <a:buFont typeface="Arial" panose="020B0604020202020204" pitchFamily="34" charset="0"/>
               <a:buChar char="•"/>
             </a:pPr>
             <a:r>
               <a:rPr lang="en-US" sz="1600" dirty="0"/>
-              <a:t>5,842 files</a:t>
+              <a:t>+ 1 unpublished</a:t>
             </a:r>
+          </a:p>
+          <a:p>
+            <a:pPr marL="742950" lvl="1" indent="-285750" algn="l">
+              <a:buFont typeface="Arial" panose="020B0604020202020204" pitchFamily="34" charset="0"/>
+              <a:buChar char="•"/>
+            </a:pPr>
+            <a:r>
+              <a:rPr lang="en-US" sz="1600" dirty="0"/>
+              <a:t>5,404 files</a:t>
+            </a:r>
+          </a:p>
+          <a:p>
+            <a:pPr marL="1200150" lvl="2" indent="-285750" algn="l">
+              <a:buFont typeface="Arial" panose="020B0604020202020204" pitchFamily="34" charset="0"/>
+              <a:buChar char="•"/>
+            </a:pPr>
+            <a:r>
+              <a:rPr lang="en-US" sz="1600" dirty="0"/>
+              <a:t>+ 439 unpublished</a:t>
+            </a:r>
+          </a:p>
+          <a:p>
+            <a:pPr marL="1200150" lvl="2" indent="-285750" algn="l">
+              <a:buFont typeface="Arial" panose="020B0604020202020204" pitchFamily="34" charset="0"/>
+              <a:buChar char="•"/>
+            </a:pPr>
+            <a:endParaRPr lang="en-US" sz="1600" dirty="0"/>
           </a:p>
           <a:p>
             <a:pPr marL="285750" indent="-285750">

</xml_diff>